<commit_message>
updated main diagram to reflect implementation
</commit_message>
<xml_diff>
--- a/admin/diagrams-images.pptx
+++ b/admin/diagrams-images.pptx
@@ -267,7 +267,7 @@
           <a:p>
             <a:fld id="{35AF8686-C6C6-4302-9234-F32FAEEE114C}" type="datetimeFigureOut">
               <a:rPr lang="nb-NO" smtClean="0"/>
-              <a:t>12.09.2019</a:t>
+              <a:t>16.09.2019</a:t>
             </a:fld>
             <a:endParaRPr lang="nb-NO"/>
           </a:p>
@@ -435,7 +435,7 @@
           <a:p>
             <a:fld id="{35AF8686-C6C6-4302-9234-F32FAEEE114C}" type="datetimeFigureOut">
               <a:rPr lang="nb-NO" smtClean="0"/>
-              <a:t>12.09.2019</a:t>
+              <a:t>16.09.2019</a:t>
             </a:fld>
             <a:endParaRPr lang="nb-NO"/>
           </a:p>
@@ -613,7 +613,7 @@
           <a:p>
             <a:fld id="{35AF8686-C6C6-4302-9234-F32FAEEE114C}" type="datetimeFigureOut">
               <a:rPr lang="nb-NO" smtClean="0"/>
-              <a:t>12.09.2019</a:t>
+              <a:t>16.09.2019</a:t>
             </a:fld>
             <a:endParaRPr lang="nb-NO"/>
           </a:p>
@@ -781,7 +781,7 @@
           <a:p>
             <a:fld id="{35AF8686-C6C6-4302-9234-F32FAEEE114C}" type="datetimeFigureOut">
               <a:rPr lang="nb-NO" smtClean="0"/>
-              <a:t>12.09.2019</a:t>
+              <a:t>16.09.2019</a:t>
             </a:fld>
             <a:endParaRPr lang="nb-NO"/>
           </a:p>
@@ -1026,7 +1026,7 @@
           <a:p>
             <a:fld id="{35AF8686-C6C6-4302-9234-F32FAEEE114C}" type="datetimeFigureOut">
               <a:rPr lang="nb-NO" smtClean="0"/>
-              <a:t>12.09.2019</a:t>
+              <a:t>16.09.2019</a:t>
             </a:fld>
             <a:endParaRPr lang="nb-NO"/>
           </a:p>
@@ -1255,7 +1255,7 @@
           <a:p>
             <a:fld id="{35AF8686-C6C6-4302-9234-F32FAEEE114C}" type="datetimeFigureOut">
               <a:rPr lang="nb-NO" smtClean="0"/>
-              <a:t>12.09.2019</a:t>
+              <a:t>16.09.2019</a:t>
             </a:fld>
             <a:endParaRPr lang="nb-NO"/>
           </a:p>
@@ -1619,7 +1619,7 @@
           <a:p>
             <a:fld id="{35AF8686-C6C6-4302-9234-F32FAEEE114C}" type="datetimeFigureOut">
               <a:rPr lang="nb-NO" smtClean="0"/>
-              <a:t>12.09.2019</a:t>
+              <a:t>16.09.2019</a:t>
             </a:fld>
             <a:endParaRPr lang="nb-NO"/>
           </a:p>
@@ -1736,7 +1736,7 @@
           <a:p>
             <a:fld id="{35AF8686-C6C6-4302-9234-F32FAEEE114C}" type="datetimeFigureOut">
               <a:rPr lang="nb-NO" smtClean="0"/>
-              <a:t>12.09.2019</a:t>
+              <a:t>16.09.2019</a:t>
             </a:fld>
             <a:endParaRPr lang="nb-NO"/>
           </a:p>
@@ -1831,7 +1831,7 @@
           <a:p>
             <a:fld id="{35AF8686-C6C6-4302-9234-F32FAEEE114C}" type="datetimeFigureOut">
               <a:rPr lang="nb-NO" smtClean="0"/>
-              <a:t>12.09.2019</a:t>
+              <a:t>16.09.2019</a:t>
             </a:fld>
             <a:endParaRPr lang="nb-NO"/>
           </a:p>
@@ -2106,7 +2106,7 @@
           <a:p>
             <a:fld id="{35AF8686-C6C6-4302-9234-F32FAEEE114C}" type="datetimeFigureOut">
               <a:rPr lang="nb-NO" smtClean="0"/>
-              <a:t>12.09.2019</a:t>
+              <a:t>16.09.2019</a:t>
             </a:fld>
             <a:endParaRPr lang="nb-NO"/>
           </a:p>
@@ -2361,7 +2361,7 @@
           <a:p>
             <a:fld id="{35AF8686-C6C6-4302-9234-F32FAEEE114C}" type="datetimeFigureOut">
               <a:rPr lang="nb-NO" smtClean="0"/>
-              <a:t>12.09.2019</a:t>
+              <a:t>16.09.2019</a:t>
             </a:fld>
             <a:endParaRPr lang="nb-NO"/>
           </a:p>
@@ -2572,7 +2572,7 @@
           <a:p>
             <a:fld id="{35AF8686-C6C6-4302-9234-F32FAEEE114C}" type="datetimeFigureOut">
               <a:rPr lang="nb-NO" smtClean="0"/>
-              <a:t>12.09.2019</a:t>
+              <a:t>16.09.2019</a:t>
             </a:fld>
             <a:endParaRPr lang="nb-NO"/>
           </a:p>
@@ -2977,6 +2977,70 @@
           <a:chExt cx="0" cy="0"/>
         </a:xfrm>
       </p:grpSpPr>
+      <p:pic>
+        <p:nvPicPr>
+          <p:cNvPr id="46" name="Picture 45">
+            <a:extLst>
+              <a:ext uri="{FF2B5EF4-FFF2-40B4-BE49-F238E27FC236}">
+                <a16:creationId xmlns:a16="http://schemas.microsoft.com/office/drawing/2014/main" id="{CF11D5AB-4D26-4F47-8AC8-E7D519295267}"/>
+              </a:ext>
+            </a:extLst>
+          </p:cNvPr>
+          <p:cNvPicPr>
+            <a:picLocks noChangeAspect="1"/>
+          </p:cNvPicPr>
+          <p:nvPr/>
+        </p:nvPicPr>
+        <p:blipFill>
+          <a:blip r:embed="rId2">
+            <a:alphaModFix amt="35000"/>
+          </a:blip>
+          <a:stretch>
+            <a:fillRect/>
+          </a:stretch>
+        </p:blipFill>
+        <p:spPr>
+          <a:xfrm>
+            <a:off x="7501364" y="1659352"/>
+            <a:ext cx="1315260" cy="927864"/>
+          </a:xfrm>
+          <a:prstGeom prst="rect">
+            <a:avLst/>
+          </a:prstGeom>
+        </p:spPr>
+      </p:pic>
+      <p:pic>
+        <p:nvPicPr>
+          <p:cNvPr id="45" name="Picture 44">
+            <a:extLst>
+              <a:ext uri="{FF2B5EF4-FFF2-40B4-BE49-F238E27FC236}">
+                <a16:creationId xmlns:a16="http://schemas.microsoft.com/office/drawing/2014/main" id="{B57E763A-5FD1-457C-9B2E-8EE889C2516D}"/>
+              </a:ext>
+            </a:extLst>
+          </p:cNvPr>
+          <p:cNvPicPr>
+            <a:picLocks noChangeAspect="1"/>
+          </p:cNvPicPr>
+          <p:nvPr/>
+        </p:nvPicPr>
+        <p:blipFill>
+          <a:blip r:embed="rId3">
+            <a:alphaModFix amt="35000"/>
+          </a:blip>
+          <a:stretch>
+            <a:fillRect/>
+          </a:stretch>
+        </p:blipFill>
+        <p:spPr>
+          <a:xfrm>
+            <a:off x="6062284" y="1638688"/>
+            <a:ext cx="1439080" cy="985246"/>
+          </a:xfrm>
+          <a:prstGeom prst="rect">
+            <a:avLst/>
+          </a:prstGeom>
+        </p:spPr>
+      </p:pic>
       <p:sp>
         <p:nvSpPr>
           <p:cNvPr id="2" name="Title 1">
@@ -3100,7 +3164,7 @@
             <p:nvPr/>
           </p:nvPicPr>
           <p:blipFill>
-            <a:blip r:embed="rId2">
+            <a:blip r:embed="rId4">
               <a:extLst>
                 <a:ext uri="{28A0092B-C50C-407E-A947-70E740481C1C}">
                   <a14:useLocalDpi xmlns:a14="http://schemas.microsoft.com/office/drawing/2010/main" val="0"/>
@@ -3136,7 +3200,7 @@
             <p:nvPr/>
           </p:nvPicPr>
           <p:blipFill>
-            <a:blip r:embed="rId3">
+            <a:blip r:embed="rId5">
               <a:extLst>
                 <a:ext uri="{28A0092B-C50C-407E-A947-70E740481C1C}">
                   <a14:useLocalDpi xmlns:a14="http://schemas.microsoft.com/office/drawing/2010/main" val="0"/>
@@ -3173,7 +3237,7 @@
           <p:nvPr/>
         </p:nvPicPr>
         <p:blipFill>
-          <a:blip r:embed="rId4">
+          <a:blip r:embed="rId6">
             <a:extLst>
               <a:ext uri="{28A0092B-C50C-407E-A947-70E740481C1C}">
                 <a14:useLocalDpi xmlns:a14="http://schemas.microsoft.com/office/drawing/2010/main" val="0"/>
@@ -3209,7 +3273,7 @@
           <p:nvPr/>
         </p:nvPicPr>
         <p:blipFill>
-          <a:blip r:embed="rId5">
+          <a:blip r:embed="rId7">
             <a:extLst>
               <a:ext uri="{28A0092B-C50C-407E-A947-70E740481C1C}">
                 <a14:useLocalDpi xmlns:a14="http://schemas.microsoft.com/office/drawing/2010/main" val="0"/>
@@ -3245,7 +3309,7 @@
           <p:nvPr/>
         </p:nvPicPr>
         <p:blipFill>
-          <a:blip r:embed="rId6">
+          <a:blip r:embed="rId8">
             <a:extLst>
               <a:ext uri="{28A0092B-C50C-407E-A947-70E740481C1C}">
                 <a14:useLocalDpi xmlns:a14="http://schemas.microsoft.com/office/drawing/2010/main" val="0"/>
@@ -3281,7 +3345,7 @@
           <p:nvPr/>
         </p:nvPicPr>
         <p:blipFill>
-          <a:blip r:embed="rId7">
+          <a:blip r:embed="rId9">
             <a:extLst>
               <a:ext uri="{28A0092B-C50C-407E-A947-70E740481C1C}">
                 <a14:useLocalDpi xmlns:a14="http://schemas.microsoft.com/office/drawing/2010/main" val="0"/>
@@ -3503,7 +3567,7 @@
           <p:nvPr/>
         </p:nvPicPr>
         <p:blipFill>
-          <a:blip r:embed="rId6">
+          <a:blip r:embed="rId8">
             <a:extLst>
               <a:ext uri="{28A0092B-C50C-407E-A947-70E740481C1C}">
                 <a14:useLocalDpi xmlns:a14="http://schemas.microsoft.com/office/drawing/2010/main" val="0"/>
@@ -3539,7 +3603,7 @@
           <p:nvPr/>
         </p:nvPicPr>
         <p:blipFill>
-          <a:blip r:embed="rId7">
+          <a:blip r:embed="rId9">
             <a:extLst>
               <a:ext uri="{28A0092B-C50C-407E-A947-70E740481C1C}">
                 <a14:useLocalDpi xmlns:a14="http://schemas.microsoft.com/office/drawing/2010/main" val="0"/>
@@ -3666,7 +3730,7 @@
           <p:nvPr/>
         </p:nvPicPr>
         <p:blipFill>
-          <a:blip r:embed="rId8">
+          <a:blip r:embed="rId10">
             <a:extLst>
               <a:ext uri="{28A0092B-C50C-407E-A947-70E740481C1C}">
                 <a14:useLocalDpi xmlns:a14="http://schemas.microsoft.com/office/drawing/2010/main" val="0"/>
@@ -3816,67 +3880,16 @@
           <a:p>
             <a:pPr algn="ctr"/>
             <a:r>
-              <a:rPr lang="nb-NO" err="1">
+              <a:rPr lang="nb-NO" dirty="0">
                 <a:solidFill>
                   <a:schemeClr val="tx1"/>
                 </a:solidFill>
               </a:rPr>
               <a:t>Expose</a:t>
             </a:r>
-            <a:endParaRPr lang="nb-NO">
-              <a:solidFill>
-                <a:schemeClr val="tx1"/>
-              </a:solidFill>
-            </a:endParaRPr>
-          </a:p>
-        </p:txBody>
-      </p:sp>
-      <p:cxnSp>
-        <p:nvCxnSpPr>
-          <p:cNvPr id="77" name="Connector: Elbow 76">
-            <a:extLst>
-              <a:ext uri="{FF2B5EF4-FFF2-40B4-BE49-F238E27FC236}">
-                <a16:creationId xmlns:a16="http://schemas.microsoft.com/office/drawing/2014/main" id="{17F13A57-2912-469C-A907-65F4380ED26B}"/>
-              </a:ext>
-            </a:extLst>
-          </p:cNvPr>
-          <p:cNvCxnSpPr>
-            <a:cxnSpLocks/>
-            <a:stCxn id="36" idx="3"/>
-            <a:endCxn id="94" idx="1"/>
-          </p:cNvCxnSpPr>
-          <p:nvPr/>
-        </p:nvCxnSpPr>
-        <p:spPr>
-          <a:xfrm>
-            <a:off x="6517077" y="4054793"/>
-            <a:ext cx="1392337" cy="614261"/>
-          </a:xfrm>
-          <a:prstGeom prst="bentConnector3">
-            <a:avLst>
-              <a:gd name="adj1" fmla="val 50000"/>
-            </a:avLst>
-          </a:prstGeom>
-          <a:ln>
-            <a:prstDash val="dashDot"/>
-            <a:tailEnd type="triangle"/>
-          </a:ln>
-        </p:spPr>
-        <p:style>
-          <a:lnRef idx="1">
-            <a:schemeClr val="accent1"/>
-          </a:lnRef>
-          <a:fillRef idx="0">
-            <a:schemeClr val="accent1"/>
-          </a:fillRef>
-          <a:effectRef idx="0">
-            <a:schemeClr val="accent1"/>
-          </a:effectRef>
-          <a:fontRef idx="minor">
-            <a:schemeClr val="tx1"/>
-          </a:fontRef>
-        </p:style>
-      </p:cxnSp>
+          </a:p>
+        </p:txBody>
+      </p:sp>
       <p:cxnSp>
         <p:nvCxnSpPr>
           <p:cNvPr id="78" name="Connector: Elbow 77">
@@ -3888,19 +3901,19 @@
           </p:cNvPr>
           <p:cNvCxnSpPr>
             <a:cxnSpLocks/>
-            <a:stCxn id="37" idx="3"/>
-            <a:endCxn id="94" idx="1"/>
+            <a:stCxn id="31" idx="2"/>
+            <a:endCxn id="94" idx="2"/>
           </p:cNvCxnSpPr>
           <p:nvPr/>
         </p:nvCxnSpPr>
         <p:spPr>
-          <a:xfrm flipV="1">
-            <a:off x="6517077" y="4669054"/>
-            <a:ext cx="1392337" cy="628852"/>
+          <a:xfrm rot="5400000" flipH="1" flipV="1">
+            <a:off x="5739137" y="3167407"/>
+            <a:ext cx="668630" cy="4333304"/>
           </a:xfrm>
           <a:prstGeom prst="bentConnector3">
             <a:avLst>
-              <a:gd name="adj1" fmla="val 50000"/>
+              <a:gd name="adj1" fmla="val -20268"/>
             </a:avLst>
           </a:prstGeom>
           <a:ln>
@@ -3966,18 +3979,13 @@
           <a:p>
             <a:pPr algn="ctr"/>
             <a:r>
-              <a:rPr lang="nb-NO" err="1">
+              <a:rPr lang="nb-NO" dirty="0">
                 <a:solidFill>
                   <a:schemeClr val="tx1"/>
                 </a:solidFill>
               </a:rPr>
               <a:t>Consume</a:t>
             </a:r>
-            <a:endParaRPr lang="nb-NO">
-              <a:solidFill>
-                <a:schemeClr val="tx1"/>
-              </a:solidFill>
-            </a:endParaRPr>
           </a:p>
         </p:txBody>
       </p:sp>
@@ -3996,7 +4004,7 @@
           <p:nvPr/>
         </p:nvPicPr>
         <p:blipFill>
-          <a:blip r:embed="rId9">
+          <a:blip r:embed="rId11">
             <a:extLst>
               <a:ext uri="{28A0092B-C50C-407E-A947-70E740481C1C}">
                 <a14:useLocalDpi xmlns:a14="http://schemas.microsoft.com/office/drawing/2010/main" val="0"/>
@@ -4032,7 +4040,7 @@
           <p:nvPr/>
         </p:nvPicPr>
         <p:blipFill>
-          <a:blip r:embed="rId8">
+          <a:blip r:embed="rId10">
             <a:extLst>
               <a:ext uri="{28A0092B-C50C-407E-A947-70E740481C1C}">
                 <a14:useLocalDpi xmlns:a14="http://schemas.microsoft.com/office/drawing/2010/main" val="0"/>
@@ -4068,7 +4076,7 @@
           <p:nvPr/>
         </p:nvPicPr>
         <p:blipFill>
-          <a:blip r:embed="rId10">
+          <a:blip r:embed="rId12">
             <a:extLst>
               <a:ext uri="{28A0092B-C50C-407E-A947-70E740481C1C}">
                 <a14:useLocalDpi xmlns:a14="http://schemas.microsoft.com/office/drawing/2010/main" val="0"/>
@@ -4191,7 +4199,7 @@
           <p:nvPr/>
         </p:nvPicPr>
         <p:blipFill>
-          <a:blip r:embed="rId4">
+          <a:blip r:embed="rId6">
             <a:extLst>
               <a:ext uri="{28A0092B-C50C-407E-A947-70E740481C1C}">
                 <a14:useLocalDpi xmlns:a14="http://schemas.microsoft.com/office/drawing/2010/main" val="0"/>
@@ -4218,70 +4226,6 @@
             <a:extLst>
               <a:ext uri="{FF2B5EF4-FFF2-40B4-BE49-F238E27FC236}">
                 <a16:creationId xmlns:a16="http://schemas.microsoft.com/office/drawing/2014/main" id="{4A524559-2F61-4176-95F1-B5CCF9DE6B60}"/>
-              </a:ext>
-            </a:extLst>
-          </p:cNvPr>
-          <p:cNvPicPr>
-            <a:picLocks noChangeAspect="1"/>
-          </p:cNvPicPr>
-          <p:nvPr/>
-        </p:nvPicPr>
-        <p:blipFill>
-          <a:blip r:embed="rId11">
-            <a:alphaModFix amt="35000"/>
-          </a:blip>
-          <a:stretch>
-            <a:fillRect/>
-          </a:stretch>
-        </p:blipFill>
-        <p:spPr>
-          <a:xfrm>
-            <a:off x="3398420" y="1690689"/>
-            <a:ext cx="1263201" cy="885521"/>
-          </a:xfrm>
-          <a:prstGeom prst="rect">
-            <a:avLst/>
-          </a:prstGeom>
-        </p:spPr>
-      </p:pic>
-      <p:pic>
-        <p:nvPicPr>
-          <p:cNvPr id="101" name="Picture 100">
-            <a:extLst>
-              <a:ext uri="{FF2B5EF4-FFF2-40B4-BE49-F238E27FC236}">
-                <a16:creationId xmlns:a16="http://schemas.microsoft.com/office/drawing/2014/main" id="{C7E7E263-8AE7-4BBD-9C26-B8E2FA30E85A}"/>
-              </a:ext>
-            </a:extLst>
-          </p:cNvPr>
-          <p:cNvPicPr>
-            <a:picLocks noChangeAspect="1"/>
-          </p:cNvPicPr>
-          <p:nvPr/>
-        </p:nvPicPr>
-        <p:blipFill>
-          <a:blip r:embed="rId12">
-            <a:alphaModFix amt="35000"/>
-          </a:blip>
-          <a:stretch>
-            <a:fillRect/>
-          </a:stretch>
-        </p:blipFill>
-        <p:spPr>
-          <a:xfrm>
-            <a:off x="4782658" y="1690688"/>
-            <a:ext cx="1263201" cy="885521"/>
-          </a:xfrm>
-          <a:prstGeom prst="rect">
-            <a:avLst/>
-          </a:prstGeom>
-        </p:spPr>
-      </p:pic>
-      <p:pic>
-        <p:nvPicPr>
-          <p:cNvPr id="102" name="Picture 101">
-            <a:extLst>
-              <a:ext uri="{FF2B5EF4-FFF2-40B4-BE49-F238E27FC236}">
-                <a16:creationId xmlns:a16="http://schemas.microsoft.com/office/drawing/2014/main" id="{909E2B5C-52B8-4D72-A1C1-D5794DD4EA57}"/>
               </a:ext>
             </a:extLst>
           </p:cNvPr>
@@ -4300,21 +4244,20 @@
         </p:blipFill>
         <p:spPr>
           <a:xfrm>
-            <a:off x="6166896" y="1690688"/>
+            <a:off x="3398420" y="1690689"/>
             <a:ext cx="1263201" cy="885521"/>
           </a:xfrm>
           <a:prstGeom prst="rect">
             <a:avLst/>
           </a:prstGeom>
-          <a:noFill/>
         </p:spPr>
       </p:pic>
       <p:pic>
         <p:nvPicPr>
-          <p:cNvPr id="103" name="Picture 102">
-            <a:extLst>
-              <a:ext uri="{FF2B5EF4-FFF2-40B4-BE49-F238E27FC236}">
-                <a16:creationId xmlns:a16="http://schemas.microsoft.com/office/drawing/2014/main" id="{B4E55E99-52AB-411B-8C8F-67B9499DC2EA}"/>
+          <p:cNvPr id="101" name="Picture 100">
+            <a:extLst>
+              <a:ext uri="{FF2B5EF4-FFF2-40B4-BE49-F238E27FC236}">
+                <a16:creationId xmlns:a16="http://schemas.microsoft.com/office/drawing/2014/main" id="{C7E7E263-8AE7-4BBD-9C26-B8E2FA30E85A}"/>
               </a:ext>
             </a:extLst>
           </p:cNvPr>
@@ -4333,7 +4276,7 @@
         </p:blipFill>
         <p:spPr>
           <a:xfrm>
-            <a:off x="7551134" y="1690688"/>
+            <a:off x="4782658" y="1690688"/>
             <a:ext cx="1263201" cy="885521"/>
           </a:xfrm>
           <a:prstGeom prst="rect">
@@ -4341,100 +4284,6 @@
           </a:prstGeom>
         </p:spPr>
       </p:pic>
-      <p:cxnSp>
-        <p:nvCxnSpPr>
-          <p:cNvPr id="105" name="Connector: Elbow 104">
-            <a:extLst>
-              <a:ext uri="{FF2B5EF4-FFF2-40B4-BE49-F238E27FC236}">
-                <a16:creationId xmlns:a16="http://schemas.microsoft.com/office/drawing/2014/main" id="{092D003F-4853-406F-9F38-3EFF348B2D6C}"/>
-              </a:ext>
-            </a:extLst>
-          </p:cNvPr>
-          <p:cNvCxnSpPr>
-            <a:cxnSpLocks/>
-            <a:stCxn id="31" idx="2"/>
-            <a:endCxn id="91" idx="1"/>
-          </p:cNvCxnSpPr>
-          <p:nvPr/>
-        </p:nvCxnSpPr>
-        <p:spPr>
-          <a:xfrm rot="5400000" flipH="1" flipV="1">
-            <a:off x="6290106" y="2285199"/>
-            <a:ext cx="999868" cy="5766481"/>
-          </a:xfrm>
-          <a:prstGeom prst="bentConnector4">
-            <a:avLst>
-              <a:gd name="adj1" fmla="val -14447"/>
-              <a:gd name="adj2" fmla="val 91518"/>
-            </a:avLst>
-          </a:prstGeom>
-          <a:ln>
-            <a:prstDash val="dashDot"/>
-            <a:tailEnd type="triangle"/>
-          </a:ln>
-        </p:spPr>
-        <p:style>
-          <a:lnRef idx="1">
-            <a:schemeClr val="accent1"/>
-          </a:lnRef>
-          <a:fillRef idx="0">
-            <a:schemeClr val="accent1"/>
-          </a:fillRef>
-          <a:effectRef idx="0">
-            <a:schemeClr val="accent1"/>
-          </a:effectRef>
-          <a:fontRef idx="minor">
-            <a:schemeClr val="tx1"/>
-          </a:fontRef>
-        </p:style>
-      </p:cxnSp>
-      <p:cxnSp>
-        <p:nvCxnSpPr>
-          <p:cNvPr id="110" name="Connector: Elbow 109">
-            <a:extLst>
-              <a:ext uri="{FF2B5EF4-FFF2-40B4-BE49-F238E27FC236}">
-                <a16:creationId xmlns:a16="http://schemas.microsoft.com/office/drawing/2014/main" id="{80C62C36-DF61-4111-919D-FC4F7F4DA9A1}"/>
-              </a:ext>
-            </a:extLst>
-          </p:cNvPr>
-          <p:cNvCxnSpPr>
-            <a:cxnSpLocks/>
-            <a:stCxn id="37" idx="2"/>
-            <a:endCxn id="91" idx="1"/>
-          </p:cNvCxnSpPr>
-          <p:nvPr/>
-        </p:nvCxnSpPr>
-        <p:spPr>
-          <a:xfrm rot="5400000" flipH="1" flipV="1">
-            <a:off x="7390333" y="3405104"/>
-            <a:ext cx="1019545" cy="3546349"/>
-          </a:xfrm>
-          <a:prstGeom prst="bentConnector4">
-            <a:avLst>
-              <a:gd name="adj1" fmla="val -11968"/>
-              <a:gd name="adj2" fmla="val 86189"/>
-            </a:avLst>
-          </a:prstGeom>
-          <a:ln>
-            <a:prstDash val="dashDot"/>
-            <a:tailEnd type="triangle"/>
-          </a:ln>
-        </p:spPr>
-        <p:style>
-          <a:lnRef idx="1">
-            <a:schemeClr val="accent1"/>
-          </a:lnRef>
-          <a:fillRef idx="0">
-            <a:schemeClr val="accent1"/>
-          </a:fillRef>
-          <a:effectRef idx="0">
-            <a:schemeClr val="accent1"/>
-          </a:effectRef>
-          <a:fontRef idx="minor">
-            <a:schemeClr val="tx1"/>
-          </a:fontRef>
-        </p:style>
-      </p:cxnSp>
     </p:spTree>
     <p:extLst>
       <p:ext uri="{BB962C8B-B14F-4D97-AF65-F5344CB8AC3E}">
@@ -4465,6 +4314,70 @@
           <a:chExt cx="0" cy="0"/>
         </a:xfrm>
       </p:grpSpPr>
+      <p:pic>
+        <p:nvPicPr>
+          <p:cNvPr id="19" name="Picture 18">
+            <a:extLst>
+              <a:ext uri="{FF2B5EF4-FFF2-40B4-BE49-F238E27FC236}">
+                <a16:creationId xmlns:a16="http://schemas.microsoft.com/office/drawing/2014/main" id="{23DA2E4E-EE91-4E36-BCFB-75BF358403CD}"/>
+              </a:ext>
+            </a:extLst>
+          </p:cNvPr>
+          <p:cNvPicPr>
+            <a:picLocks noChangeAspect="1"/>
+          </p:cNvPicPr>
+          <p:nvPr/>
+        </p:nvPicPr>
+        <p:blipFill>
+          <a:blip r:embed="rId2">
+            <a:alphaModFix amt="35000"/>
+          </a:blip>
+          <a:stretch>
+            <a:fillRect/>
+          </a:stretch>
+        </p:blipFill>
+        <p:spPr>
+          <a:xfrm>
+            <a:off x="4938856" y="1667559"/>
+            <a:ext cx="1315260" cy="927864"/>
+          </a:xfrm>
+          <a:prstGeom prst="rect">
+            <a:avLst/>
+          </a:prstGeom>
+        </p:spPr>
+      </p:pic>
+      <p:pic>
+        <p:nvPicPr>
+          <p:cNvPr id="18" name="Picture 17">
+            <a:extLst>
+              <a:ext uri="{FF2B5EF4-FFF2-40B4-BE49-F238E27FC236}">
+                <a16:creationId xmlns:a16="http://schemas.microsoft.com/office/drawing/2014/main" id="{46073D7F-5B27-4B3D-B6CD-39813EFB251A}"/>
+              </a:ext>
+            </a:extLst>
+          </p:cNvPr>
+          <p:cNvPicPr>
+            <a:picLocks noChangeAspect="1"/>
+          </p:cNvPicPr>
+          <p:nvPr/>
+        </p:nvPicPr>
+        <p:blipFill>
+          <a:blip r:embed="rId3">
+            <a:alphaModFix amt="35000"/>
+          </a:blip>
+          <a:stretch>
+            <a:fillRect/>
+          </a:stretch>
+        </p:blipFill>
+        <p:spPr>
+          <a:xfrm>
+            <a:off x="3486980" y="1618625"/>
+            <a:ext cx="1466641" cy="1004115"/>
+          </a:xfrm>
+          <a:prstGeom prst="rect">
+            <a:avLst/>
+          </a:prstGeom>
+        </p:spPr>
+      </p:pic>
       <p:sp>
         <p:nvSpPr>
           <p:cNvPr id="24" name="Rectangle: Rounded Corners 23">
@@ -4559,7 +4472,7 @@
             <p:nvPr/>
           </p:nvPicPr>
           <p:blipFill>
-            <a:blip r:embed="rId2">
+            <a:blip r:embed="rId4">
               <a:extLst>
                 <a:ext uri="{28A0092B-C50C-407E-A947-70E740481C1C}">
                   <a14:useLocalDpi xmlns:a14="http://schemas.microsoft.com/office/drawing/2010/main" val="0"/>
@@ -4595,7 +4508,7 @@
             <p:nvPr/>
           </p:nvPicPr>
           <p:blipFill>
-            <a:blip r:embed="rId3">
+            <a:blip r:embed="rId5">
               <a:extLst>
                 <a:ext uri="{28A0092B-C50C-407E-A947-70E740481C1C}">
                   <a14:useLocalDpi xmlns:a14="http://schemas.microsoft.com/office/drawing/2010/main" val="0"/>
@@ -4632,7 +4545,7 @@
           <p:nvPr/>
         </p:nvPicPr>
         <p:blipFill>
-          <a:blip r:embed="rId4">
+          <a:blip r:embed="rId6">
             <a:extLst>
               <a:ext uri="{28A0092B-C50C-407E-A947-70E740481C1C}">
                 <a14:useLocalDpi xmlns:a14="http://schemas.microsoft.com/office/drawing/2010/main" val="0"/>
@@ -4668,7 +4581,7 @@
           <p:nvPr/>
         </p:nvPicPr>
         <p:blipFill>
-          <a:blip r:embed="rId5">
+          <a:blip r:embed="rId7">
             <a:extLst>
               <a:ext uri="{28A0092B-C50C-407E-A947-70E740481C1C}">
                 <a14:useLocalDpi xmlns:a14="http://schemas.microsoft.com/office/drawing/2010/main" val="0"/>
@@ -4704,7 +4617,7 @@
           <p:nvPr/>
         </p:nvPicPr>
         <p:blipFill>
-          <a:blip r:embed="rId6">
+          <a:blip r:embed="rId8">
             <a:extLst>
               <a:ext uri="{28A0092B-C50C-407E-A947-70E740481C1C}">
                 <a14:useLocalDpi xmlns:a14="http://schemas.microsoft.com/office/drawing/2010/main" val="0"/>
@@ -4740,7 +4653,7 @@
           <p:nvPr/>
         </p:nvPicPr>
         <p:blipFill>
-          <a:blip r:embed="rId7">
+          <a:blip r:embed="rId9">
             <a:extLst>
               <a:ext uri="{28A0092B-C50C-407E-A947-70E740481C1C}">
                 <a14:useLocalDpi xmlns:a14="http://schemas.microsoft.com/office/drawing/2010/main" val="0"/>
@@ -4931,7 +4844,7 @@
           <p:nvPr/>
         </p:nvPicPr>
         <p:blipFill>
-          <a:blip r:embed="rId8"/>
+          <a:blip r:embed="rId10"/>
           <a:stretch>
             <a:fillRect/>
           </a:stretch>
@@ -4952,71 +4865,6 @@
             <a:extLst>
               <a:ext uri="{FF2B5EF4-FFF2-40B4-BE49-F238E27FC236}">
                 <a16:creationId xmlns:a16="http://schemas.microsoft.com/office/drawing/2014/main" id="{4F1748D0-04AD-46CE-894D-82CB246A45D0}"/>
-              </a:ext>
-            </a:extLst>
-          </p:cNvPr>
-          <p:cNvPicPr>
-            <a:picLocks noChangeAspect="1"/>
-          </p:cNvPicPr>
-          <p:nvPr/>
-        </p:nvPicPr>
-        <p:blipFill>
-          <a:blip r:embed="rId9">
-            <a:alphaModFix amt="35000"/>
-          </a:blip>
-          <a:stretch>
-            <a:fillRect/>
-          </a:stretch>
-        </p:blipFill>
-        <p:spPr>
-          <a:xfrm>
-            <a:off x="2222438" y="1690687"/>
-            <a:ext cx="1263201" cy="885521"/>
-          </a:xfrm>
-          <a:prstGeom prst="rect">
-            <a:avLst/>
-          </a:prstGeom>
-        </p:spPr>
-      </p:pic>
-      <p:pic>
-        <p:nvPicPr>
-          <p:cNvPr id="63" name="Picture 62">
-            <a:extLst>
-              <a:ext uri="{FF2B5EF4-FFF2-40B4-BE49-F238E27FC236}">
-                <a16:creationId xmlns:a16="http://schemas.microsoft.com/office/drawing/2014/main" id="{4C31CA14-6C41-4FF2-BCDD-B2665B631764}"/>
-              </a:ext>
-            </a:extLst>
-          </p:cNvPr>
-          <p:cNvPicPr>
-            <a:picLocks noChangeAspect="1"/>
-          </p:cNvPicPr>
-          <p:nvPr/>
-        </p:nvPicPr>
-        <p:blipFill>
-          <a:blip r:embed="rId10">
-            <a:alphaModFix amt="35000"/>
-          </a:blip>
-          <a:stretch>
-            <a:fillRect/>
-          </a:stretch>
-        </p:blipFill>
-        <p:spPr>
-          <a:xfrm>
-            <a:off x="3606676" y="1690687"/>
-            <a:ext cx="1263201" cy="885521"/>
-          </a:xfrm>
-          <a:prstGeom prst="rect">
-            <a:avLst/>
-          </a:prstGeom>
-          <a:noFill/>
-        </p:spPr>
-      </p:pic>
-      <p:pic>
-        <p:nvPicPr>
-          <p:cNvPr id="64" name="Picture 63">
-            <a:extLst>
-              <a:ext uri="{FF2B5EF4-FFF2-40B4-BE49-F238E27FC236}">
-                <a16:creationId xmlns:a16="http://schemas.microsoft.com/office/drawing/2014/main" id="{DDA4C4DD-CFA4-41FE-A717-DB8CFAA986C6}"/>
               </a:ext>
             </a:extLst>
           </p:cNvPr>
@@ -5035,7 +4883,7 @@
         </p:blipFill>
         <p:spPr>
           <a:xfrm>
-            <a:off x="4990914" y="1690687"/>
+            <a:off x="2222438" y="1690687"/>
             <a:ext cx="1263201" cy="885521"/>
           </a:xfrm>
           <a:prstGeom prst="rect">
@@ -5073,6 +4921,70 @@
           <a:chExt cx="0" cy="0"/>
         </a:xfrm>
       </p:grpSpPr>
+      <p:pic>
+        <p:nvPicPr>
+          <p:cNvPr id="18" name="Picture 17">
+            <a:extLst>
+              <a:ext uri="{FF2B5EF4-FFF2-40B4-BE49-F238E27FC236}">
+                <a16:creationId xmlns:a16="http://schemas.microsoft.com/office/drawing/2014/main" id="{78BAB0A2-288F-4695-9828-D5A39192E540}"/>
+              </a:ext>
+            </a:extLst>
+          </p:cNvPr>
+          <p:cNvPicPr>
+            <a:picLocks noChangeAspect="1"/>
+          </p:cNvPicPr>
+          <p:nvPr/>
+        </p:nvPicPr>
+        <p:blipFill>
+          <a:blip r:embed="rId2">
+            <a:alphaModFix amt="35000"/>
+          </a:blip>
+          <a:stretch>
+            <a:fillRect/>
+          </a:stretch>
+        </p:blipFill>
+        <p:spPr>
+          <a:xfrm>
+            <a:off x="4938856" y="1667559"/>
+            <a:ext cx="1315260" cy="927864"/>
+          </a:xfrm>
+          <a:prstGeom prst="rect">
+            <a:avLst/>
+          </a:prstGeom>
+        </p:spPr>
+      </p:pic>
+      <p:pic>
+        <p:nvPicPr>
+          <p:cNvPr id="17" name="Picture 16">
+            <a:extLst>
+              <a:ext uri="{FF2B5EF4-FFF2-40B4-BE49-F238E27FC236}">
+                <a16:creationId xmlns:a16="http://schemas.microsoft.com/office/drawing/2014/main" id="{87FA7746-A34F-4C26-9B0E-5600E1B9E8B7}"/>
+              </a:ext>
+            </a:extLst>
+          </p:cNvPr>
+          <p:cNvPicPr>
+            <a:picLocks noChangeAspect="1"/>
+          </p:cNvPicPr>
+          <p:nvPr/>
+        </p:nvPicPr>
+        <p:blipFill>
+          <a:blip r:embed="rId3">
+            <a:alphaModFix amt="35000"/>
+          </a:blip>
+          <a:stretch>
+            <a:fillRect/>
+          </a:stretch>
+        </p:blipFill>
+        <p:spPr>
+          <a:xfrm>
+            <a:off x="3508881" y="1640526"/>
+            <a:ext cx="1429974" cy="979012"/>
+          </a:xfrm>
+          <a:prstGeom prst="rect">
+            <a:avLst/>
+          </a:prstGeom>
+        </p:spPr>
+      </p:pic>
       <p:sp>
         <p:nvSpPr>
           <p:cNvPr id="27" name="Rectangle: Rounded Corners 26">
@@ -5142,7 +5054,7 @@
           <p:nvPr/>
         </p:nvPicPr>
         <p:blipFill>
-          <a:blip r:embed="rId2">
+          <a:blip r:embed="rId4">
             <a:extLst>
               <a:ext uri="{28A0092B-C50C-407E-A947-70E740481C1C}">
                 <a14:useLocalDpi xmlns:a14="http://schemas.microsoft.com/office/drawing/2010/main" val="0"/>
@@ -5178,7 +5090,7 @@
           <p:nvPr/>
         </p:nvPicPr>
         <p:blipFill>
-          <a:blip r:embed="rId3">
+          <a:blip r:embed="rId5">
             <a:extLst>
               <a:ext uri="{28A0092B-C50C-407E-A947-70E740481C1C}">
                 <a14:useLocalDpi xmlns:a14="http://schemas.microsoft.com/office/drawing/2010/main" val="0"/>
@@ -5305,7 +5217,7 @@
           <p:nvPr/>
         </p:nvPicPr>
         <p:blipFill>
-          <a:blip r:embed="rId4">
+          <a:blip r:embed="rId6">
             <a:extLst>
               <a:ext uri="{28A0092B-C50C-407E-A947-70E740481C1C}">
                 <a14:useLocalDpi xmlns:a14="http://schemas.microsoft.com/office/drawing/2010/main" val="0"/>
@@ -5370,7 +5282,7 @@
           <p:nvPr/>
         </p:nvPicPr>
         <p:blipFill>
-          <a:blip r:embed="rId2">
+          <a:blip r:embed="rId4">
             <a:extLst>
               <a:ext uri="{28A0092B-C50C-407E-A947-70E740481C1C}">
                 <a14:useLocalDpi xmlns:a14="http://schemas.microsoft.com/office/drawing/2010/main" val="0"/>
@@ -5406,7 +5318,7 @@
           <p:nvPr/>
         </p:nvPicPr>
         <p:blipFill>
-          <a:blip r:embed="rId3">
+          <a:blip r:embed="rId5">
             <a:extLst>
               <a:ext uri="{28A0092B-C50C-407E-A947-70E740481C1C}">
                 <a14:useLocalDpi xmlns:a14="http://schemas.microsoft.com/office/drawing/2010/main" val="0"/>
@@ -5527,68 +5439,6 @@
           <p:nvPr/>
         </p:nvPicPr>
         <p:blipFill>
-          <a:blip r:embed="rId5">
-            <a:alphaModFix amt="35000"/>
-          </a:blip>
-          <a:stretch>
-            <a:fillRect/>
-          </a:stretch>
-        </p:blipFill>
-        <p:spPr>
-          <a:xfrm>
-            <a:off x="838200" y="1690689"/>
-            <a:ext cx="1263201" cy="885521"/>
-          </a:xfrm>
-          <a:prstGeom prst="rect">
-            <a:avLst/>
-          </a:prstGeom>
-        </p:spPr>
-      </p:pic>
-      <p:pic>
-        <p:nvPicPr>
-          <p:cNvPr id="69" name="Picture 68">
-            <a:extLst>
-              <a:ext uri="{FF2B5EF4-FFF2-40B4-BE49-F238E27FC236}">
-                <a16:creationId xmlns:a16="http://schemas.microsoft.com/office/drawing/2014/main" id="{14633466-41C8-4770-A163-6F0ABFC77C0B}"/>
-              </a:ext>
-            </a:extLst>
-          </p:cNvPr>
-          <p:cNvPicPr>
-            <a:picLocks noChangeAspect="1"/>
-          </p:cNvPicPr>
-          <p:nvPr/>
-        </p:nvPicPr>
-        <p:blipFill>
-          <a:blip r:embed="rId6"/>
-          <a:stretch>
-            <a:fillRect/>
-          </a:stretch>
-        </p:blipFill>
-        <p:spPr>
-          <a:xfrm>
-            <a:off x="2222438" y="1690688"/>
-            <a:ext cx="1263201" cy="885521"/>
-          </a:xfrm>
-          <a:prstGeom prst="rect">
-            <a:avLst/>
-          </a:prstGeom>
-        </p:spPr>
-      </p:pic>
-      <p:pic>
-        <p:nvPicPr>
-          <p:cNvPr id="70" name="Picture 69">
-            <a:extLst>
-              <a:ext uri="{FF2B5EF4-FFF2-40B4-BE49-F238E27FC236}">
-                <a16:creationId xmlns:a16="http://schemas.microsoft.com/office/drawing/2014/main" id="{B89D18E4-556B-4DC4-B881-223B01944DD2}"/>
-              </a:ext>
-            </a:extLst>
-          </p:cNvPr>
-          <p:cNvPicPr>
-            <a:picLocks noChangeAspect="1"/>
-          </p:cNvPicPr>
-          <p:nvPr/>
-        </p:nvPicPr>
-        <p:blipFill>
           <a:blip r:embed="rId7">
             <a:alphaModFix amt="35000"/>
           </a:blip>
@@ -5598,21 +5448,20 @@
         </p:blipFill>
         <p:spPr>
           <a:xfrm>
-            <a:off x="3606676" y="1690688"/>
+            <a:off x="838200" y="1690689"/>
             <a:ext cx="1263201" cy="885521"/>
           </a:xfrm>
           <a:prstGeom prst="rect">
             <a:avLst/>
           </a:prstGeom>
-          <a:noFill/>
         </p:spPr>
       </p:pic>
       <p:pic>
         <p:nvPicPr>
-          <p:cNvPr id="71" name="Picture 70">
-            <a:extLst>
-              <a:ext uri="{FF2B5EF4-FFF2-40B4-BE49-F238E27FC236}">
-                <a16:creationId xmlns:a16="http://schemas.microsoft.com/office/drawing/2014/main" id="{8D6D841A-4E88-4E5B-BAB9-0C212C8BF03F}"/>
+          <p:cNvPr id="69" name="Picture 68">
+            <a:extLst>
+              <a:ext uri="{FF2B5EF4-FFF2-40B4-BE49-F238E27FC236}">
+                <a16:creationId xmlns:a16="http://schemas.microsoft.com/office/drawing/2014/main" id="{14633466-41C8-4770-A163-6F0ABFC77C0B}"/>
               </a:ext>
             </a:extLst>
           </p:cNvPr>
@@ -5622,16 +5471,14 @@
           <p:nvPr/>
         </p:nvPicPr>
         <p:blipFill>
-          <a:blip r:embed="rId8">
-            <a:alphaModFix amt="35000"/>
-          </a:blip>
+          <a:blip r:embed="rId8"/>
           <a:stretch>
             <a:fillRect/>
           </a:stretch>
         </p:blipFill>
         <p:spPr>
           <a:xfrm>
-            <a:off x="4990914" y="1690688"/>
+            <a:off x="2222438" y="1690688"/>
             <a:ext cx="1263201" cy="885521"/>
           </a:xfrm>
           <a:prstGeom prst="rect">
@@ -5669,6 +5516,38 @@
           <a:chExt cx="0" cy="0"/>
         </a:xfrm>
       </p:grpSpPr>
+      <p:pic>
+        <p:nvPicPr>
+          <p:cNvPr id="16" name="Picture 15">
+            <a:extLst>
+              <a:ext uri="{FF2B5EF4-FFF2-40B4-BE49-F238E27FC236}">
+                <a16:creationId xmlns:a16="http://schemas.microsoft.com/office/drawing/2014/main" id="{626272A6-E320-4C22-894C-2DA2524417EE}"/>
+              </a:ext>
+            </a:extLst>
+          </p:cNvPr>
+          <p:cNvPicPr>
+            <a:picLocks noChangeAspect="1"/>
+          </p:cNvPicPr>
+          <p:nvPr/>
+        </p:nvPicPr>
+        <p:blipFill>
+          <a:blip r:embed="rId2">
+            <a:alphaModFix amt="35000"/>
+          </a:blip>
+          <a:stretch>
+            <a:fillRect/>
+          </a:stretch>
+        </p:blipFill>
+        <p:spPr>
+          <a:xfrm>
+            <a:off x="4938856" y="1667559"/>
+            <a:ext cx="1315260" cy="927864"/>
+          </a:xfrm>
+          <a:prstGeom prst="rect">
+            <a:avLst/>
+          </a:prstGeom>
+        </p:spPr>
+      </p:pic>
       <p:sp>
         <p:nvSpPr>
           <p:cNvPr id="27" name="Rectangle: Rounded Corners 26">
@@ -5713,27 +5592,22 @@
           <a:p>
             <a:pPr algn="ctr"/>
             <a:r>
-              <a:rPr lang="nb-NO" err="1">
+              <a:rPr lang="nb-NO" dirty="0">
                 <a:solidFill>
                   <a:schemeClr val="tx1"/>
                 </a:solidFill>
               </a:rPr>
               <a:t>Expose</a:t>
             </a:r>
-            <a:endParaRPr lang="nb-NO">
-              <a:solidFill>
-                <a:schemeClr val="tx1"/>
-              </a:solidFill>
-            </a:endParaRPr>
           </a:p>
         </p:txBody>
       </p:sp>
       <p:pic>
         <p:nvPicPr>
-          <p:cNvPr id="39" name="Picture 38">
-            <a:extLst>
-              <a:ext uri="{FF2B5EF4-FFF2-40B4-BE49-F238E27FC236}">
-                <a16:creationId xmlns:a16="http://schemas.microsoft.com/office/drawing/2014/main" id="{C200C05E-1849-402A-8BD8-30010F873440}"/>
+          <p:cNvPr id="40" name="Picture 39">
+            <a:extLst>
+              <a:ext uri="{FF2B5EF4-FFF2-40B4-BE49-F238E27FC236}">
+                <a16:creationId xmlns:a16="http://schemas.microsoft.com/office/drawing/2014/main" id="{B6218232-0AF8-4C60-AFE1-5978CED7E468}"/>
               </a:ext>
             </a:extLst>
           </p:cNvPr>
@@ -5743,7 +5617,7 @@
           <p:nvPr/>
         </p:nvPicPr>
         <p:blipFill>
-          <a:blip r:embed="rId2">
+          <a:blip r:embed="rId3">
             <a:extLst>
               <a:ext uri="{28A0092B-C50C-407E-A947-70E740481C1C}">
                 <a14:useLocalDpi xmlns:a14="http://schemas.microsoft.com/office/drawing/2010/main" val="0"/>
@@ -5756,43 +5630,7 @@
         </p:blipFill>
         <p:spPr>
           <a:xfrm>
-            <a:off x="1255778" y="3859013"/>
-            <a:ext cx="780290" cy="780290"/>
-          </a:xfrm>
-          <a:prstGeom prst="rect">
-            <a:avLst/>
-          </a:prstGeom>
-        </p:spPr>
-      </p:pic>
-      <p:pic>
-        <p:nvPicPr>
-          <p:cNvPr id="40" name="Picture 39">
-            <a:extLst>
-              <a:ext uri="{FF2B5EF4-FFF2-40B4-BE49-F238E27FC236}">
-                <a16:creationId xmlns:a16="http://schemas.microsoft.com/office/drawing/2014/main" id="{B6218232-0AF8-4C60-AFE1-5978CED7E468}"/>
-              </a:ext>
-            </a:extLst>
-          </p:cNvPr>
-          <p:cNvPicPr>
-            <a:picLocks noChangeAspect="1"/>
-          </p:cNvPicPr>
-          <p:nvPr/>
-        </p:nvPicPr>
-        <p:blipFill>
-          <a:blip r:embed="rId3">
-            <a:extLst>
-              <a:ext uri="{28A0092B-C50C-407E-A947-70E740481C1C}">
-                <a14:useLocalDpi xmlns:a14="http://schemas.microsoft.com/office/drawing/2010/main" val="0"/>
-              </a:ext>
-            </a:extLst>
-          </a:blip>
-          <a:stretch>
-            <a:fillRect/>
-          </a:stretch>
-        </p:blipFill>
-        <p:spPr>
-          <a:xfrm>
-            <a:off x="1255778" y="4775813"/>
+            <a:off x="1235671" y="4309805"/>
             <a:ext cx="780290" cy="780290"/>
           </a:xfrm>
           <a:prstGeom prst="rect">
@@ -5857,8 +5695,8 @@
         </p:blipFill>
         <p:spPr>
           <a:xfrm>
-            <a:off x="3193721" y="4249158"/>
-            <a:ext cx="879684" cy="879684"/>
+            <a:off x="3193720" y="4243682"/>
+            <a:ext cx="912679" cy="912679"/>
           </a:xfrm>
           <a:prstGeom prst="rect">
             <a:avLst/>
@@ -5867,66 +5705,24 @@
       </p:pic>
       <p:cxnSp>
         <p:nvCxnSpPr>
-          <p:cNvPr id="3" name="Connector: Elbow 2">
-            <a:extLst>
-              <a:ext uri="{FF2B5EF4-FFF2-40B4-BE49-F238E27FC236}">
-                <a16:creationId xmlns:a16="http://schemas.microsoft.com/office/drawing/2014/main" id="{53D77911-5150-4A96-974B-4FFE953ACF6E}"/>
+          <p:cNvPr id="5" name="Connector: Elbow 4">
+            <a:extLst>
+              <a:ext uri="{FF2B5EF4-FFF2-40B4-BE49-F238E27FC236}">
+                <a16:creationId xmlns:a16="http://schemas.microsoft.com/office/drawing/2014/main" id="{A2B1556E-1568-4BB1-AB87-2914568D1749}"/>
               </a:ext>
             </a:extLst>
           </p:cNvPr>
           <p:cNvCxnSpPr>
-            <a:stCxn id="39" idx="3"/>
-            <a:endCxn id="10" idx="1"/>
-          </p:cNvCxnSpPr>
-          <p:nvPr/>
-        </p:nvCxnSpPr>
-        <p:spPr>
-          <a:xfrm>
-            <a:off x="2036068" y="4249158"/>
-            <a:ext cx="1157653" cy="439842"/>
-          </a:xfrm>
-          <a:prstGeom prst="bentConnector3">
-            <a:avLst/>
-          </a:prstGeom>
-          <a:ln>
-            <a:prstDash val="dashDot"/>
-            <a:tailEnd type="triangle"/>
-          </a:ln>
-        </p:spPr>
-        <p:style>
-          <a:lnRef idx="1">
-            <a:schemeClr val="accent1"/>
-          </a:lnRef>
-          <a:fillRef idx="0">
-            <a:schemeClr val="accent1"/>
-          </a:fillRef>
-          <a:effectRef idx="0">
-            <a:schemeClr val="accent1"/>
-          </a:effectRef>
-          <a:fontRef idx="minor">
-            <a:schemeClr val="tx1"/>
-          </a:fontRef>
-        </p:style>
-      </p:cxnSp>
-      <p:cxnSp>
-        <p:nvCxnSpPr>
-          <p:cNvPr id="5" name="Connector: Elbow 4">
-            <a:extLst>
-              <a:ext uri="{FF2B5EF4-FFF2-40B4-BE49-F238E27FC236}">
-                <a16:creationId xmlns:a16="http://schemas.microsoft.com/office/drawing/2014/main" id="{A2B1556E-1568-4BB1-AB87-2914568D1749}"/>
-              </a:ext>
-            </a:extLst>
-          </p:cNvPr>
-          <p:cNvCxnSpPr>
+            <a:cxnSpLocks/>
             <a:stCxn id="40" idx="3"/>
             <a:endCxn id="10" idx="1"/>
           </p:cNvCxnSpPr>
           <p:nvPr/>
         </p:nvCxnSpPr>
         <p:spPr>
-          <a:xfrm flipV="1">
-            <a:off x="2036068" y="4689000"/>
-            <a:ext cx="1157653" cy="476958"/>
+          <a:xfrm>
+            <a:off x="2015961" y="4699950"/>
+            <a:ext cx="1177759" cy="72"/>
           </a:xfrm>
           <a:prstGeom prst="bentConnector3">
             <a:avLst/>
@@ -6049,10 +5845,10 @@
       </p:pic>
       <p:pic>
         <p:nvPicPr>
-          <p:cNvPr id="37" name="Picture 36">
-            <a:extLst>
-              <a:ext uri="{FF2B5EF4-FFF2-40B4-BE49-F238E27FC236}">
-                <a16:creationId xmlns:a16="http://schemas.microsoft.com/office/drawing/2014/main" id="{CCD03C17-D8CE-4478-825F-2642EFB005C7}"/>
+          <p:cNvPr id="6" name="Picture 5">
+            <a:extLst>
+              <a:ext uri="{FF2B5EF4-FFF2-40B4-BE49-F238E27FC236}">
+                <a16:creationId xmlns:a16="http://schemas.microsoft.com/office/drawing/2014/main" id="{162A8178-9F2F-4E94-BA0E-2C505BB5E9CE}"/>
               </a:ext>
             </a:extLst>
           </p:cNvPr>
@@ -6062,17 +5858,15 @@
           <p:nvPr/>
         </p:nvPicPr>
         <p:blipFill>
-          <a:blip r:embed="rId8">
-            <a:alphaModFix amt="35000"/>
-          </a:blip>
+          <a:blip r:embed="rId8"/>
           <a:stretch>
             <a:fillRect/>
           </a:stretch>
         </p:blipFill>
         <p:spPr>
           <a:xfrm>
-            <a:off x="4990914" y="1690688"/>
-            <a:ext cx="1263201" cy="885521"/>
+            <a:off x="3486980" y="1618625"/>
+            <a:ext cx="1462826" cy="1001503"/>
           </a:xfrm>
           <a:prstGeom prst="rect">
             <a:avLst/>
@@ -6109,6 +5903,68 @@
           <a:chExt cx="0" cy="0"/>
         </a:xfrm>
       </p:grpSpPr>
+      <p:pic>
+        <p:nvPicPr>
+          <p:cNvPr id="5" name="Picture 4">
+            <a:extLst>
+              <a:ext uri="{FF2B5EF4-FFF2-40B4-BE49-F238E27FC236}">
+                <a16:creationId xmlns:a16="http://schemas.microsoft.com/office/drawing/2014/main" id="{9A893AA0-F215-489E-83F9-6D55441FFBB9}"/>
+              </a:ext>
+            </a:extLst>
+          </p:cNvPr>
+          <p:cNvPicPr>
+            <a:picLocks noChangeAspect="1"/>
+          </p:cNvPicPr>
+          <p:nvPr/>
+        </p:nvPicPr>
+        <p:blipFill>
+          <a:blip r:embed="rId2"/>
+          <a:stretch>
+            <a:fillRect/>
+          </a:stretch>
+        </p:blipFill>
+        <p:spPr>
+          <a:xfrm>
+            <a:off x="4938856" y="1667559"/>
+            <a:ext cx="1315260" cy="927864"/>
+          </a:xfrm>
+          <a:prstGeom prst="rect">
+            <a:avLst/>
+          </a:prstGeom>
+        </p:spPr>
+      </p:pic>
+      <p:pic>
+        <p:nvPicPr>
+          <p:cNvPr id="16" name="Picture 15">
+            <a:extLst>
+              <a:ext uri="{FF2B5EF4-FFF2-40B4-BE49-F238E27FC236}">
+                <a16:creationId xmlns:a16="http://schemas.microsoft.com/office/drawing/2014/main" id="{7084B82D-0191-4C87-ABD1-A896E660FBA8}"/>
+              </a:ext>
+            </a:extLst>
+          </p:cNvPr>
+          <p:cNvPicPr>
+            <a:picLocks noChangeAspect="1"/>
+          </p:cNvPicPr>
+          <p:nvPr/>
+        </p:nvPicPr>
+        <p:blipFill>
+          <a:blip r:embed="rId3">
+            <a:alphaModFix amt="35000"/>
+          </a:blip>
+          <a:stretch>
+            <a:fillRect/>
+          </a:stretch>
+        </p:blipFill>
+        <p:spPr>
+          <a:xfrm>
+            <a:off x="3508881" y="1640526"/>
+            <a:ext cx="1429974" cy="979012"/>
+          </a:xfrm>
+          <a:prstGeom prst="rect">
+            <a:avLst/>
+          </a:prstGeom>
+        </p:spPr>
+      </p:pic>
       <p:sp>
         <p:nvSpPr>
           <p:cNvPr id="27" name="Rectangle: Rounded Corners 26">
@@ -6153,57 +6009,16 @@
           <a:p>
             <a:pPr algn="ctr"/>
             <a:r>
-              <a:rPr lang="nb-NO" err="1">
+              <a:rPr lang="nb-NO" dirty="0">
                 <a:solidFill>
                   <a:schemeClr val="tx1"/>
                 </a:solidFill>
               </a:rPr>
               <a:t>Consume</a:t>
             </a:r>
-            <a:endParaRPr lang="nb-NO">
-              <a:solidFill>
-                <a:schemeClr val="tx1"/>
-              </a:solidFill>
-            </a:endParaRPr>
-          </a:p>
-        </p:txBody>
-      </p:sp>
-      <p:pic>
-        <p:nvPicPr>
-          <p:cNvPr id="40" name="Picture 39">
-            <a:extLst>
-              <a:ext uri="{FF2B5EF4-FFF2-40B4-BE49-F238E27FC236}">
-                <a16:creationId xmlns:a16="http://schemas.microsoft.com/office/drawing/2014/main" id="{B6218232-0AF8-4C60-AFE1-5978CED7E468}"/>
-              </a:ext>
-            </a:extLst>
-          </p:cNvPr>
-          <p:cNvPicPr>
-            <a:picLocks noChangeAspect="1"/>
-          </p:cNvPicPr>
-          <p:nvPr/>
-        </p:nvPicPr>
-        <p:blipFill>
-          <a:blip r:embed="rId2">
-            <a:extLst>
-              <a:ext uri="{28A0092B-C50C-407E-A947-70E740481C1C}">
-                <a14:useLocalDpi xmlns:a14="http://schemas.microsoft.com/office/drawing/2010/main" val="0"/>
-              </a:ext>
-            </a:extLst>
-          </a:blip>
-          <a:stretch>
-            <a:fillRect/>
-          </a:stretch>
-        </p:blipFill>
-        <p:spPr>
-          <a:xfrm>
-            <a:off x="1206880" y="4835330"/>
-            <a:ext cx="780290" cy="780290"/>
-          </a:xfrm>
-          <a:prstGeom prst="rect">
-            <a:avLst/>
-          </a:prstGeom>
-        </p:spPr>
-      </p:pic>
+          </a:p>
+        </p:txBody>
+      </p:sp>
       <p:sp>
         <p:nvSpPr>
           <p:cNvPr id="46" name="Title 45">
@@ -6248,7 +6063,7 @@
           <p:nvPr/>
         </p:nvPicPr>
         <p:blipFill>
-          <a:blip r:embed="rId3">
+          <a:blip r:embed="rId4">
             <a:extLst>
               <a:ext uri="{28A0092B-C50C-407E-A947-70E740481C1C}">
                 <a14:useLocalDpi xmlns:a14="http://schemas.microsoft.com/office/drawing/2010/main" val="0"/>
@@ -6261,7 +6076,7 @@
         </p:blipFill>
         <p:spPr>
           <a:xfrm>
-            <a:off x="1304416" y="3916732"/>
+            <a:off x="1315367" y="4496447"/>
             <a:ext cx="585218" cy="585218"/>
           </a:xfrm>
           <a:prstGeom prst="rect">
@@ -6275,38 +6090,6 @@
             <a:extLst>
               <a:ext uri="{FF2B5EF4-FFF2-40B4-BE49-F238E27FC236}">
                 <a16:creationId xmlns:a16="http://schemas.microsoft.com/office/drawing/2014/main" id="{57C3A00B-0294-4199-A1FC-A7F47D3D690F}"/>
-              </a:ext>
-            </a:extLst>
-          </p:cNvPr>
-          <p:cNvPicPr>
-            <a:picLocks noChangeAspect="1"/>
-          </p:cNvPicPr>
-          <p:nvPr/>
-        </p:nvPicPr>
-        <p:blipFill>
-          <a:blip r:embed="rId4">
-            <a:alphaModFix amt="35000"/>
-          </a:blip>
-          <a:stretch>
-            <a:fillRect/>
-          </a:stretch>
-        </p:blipFill>
-        <p:spPr>
-          <a:xfrm>
-            <a:off x="838200" y="1690688"/>
-            <a:ext cx="1263201" cy="885521"/>
-          </a:xfrm>
-          <a:prstGeom prst="rect">
-            <a:avLst/>
-          </a:prstGeom>
-        </p:spPr>
-      </p:pic>
-      <p:pic>
-        <p:nvPicPr>
-          <p:cNvPr id="33" name="Picture 32">
-            <a:extLst>
-              <a:ext uri="{FF2B5EF4-FFF2-40B4-BE49-F238E27FC236}">
-                <a16:creationId xmlns:a16="http://schemas.microsoft.com/office/drawing/2014/main" id="{5EE27BFF-CC36-42F8-80A0-A00748767C28}"/>
               </a:ext>
             </a:extLst>
           </p:cNvPr>
@@ -6325,7 +6108,7 @@
         </p:blipFill>
         <p:spPr>
           <a:xfrm>
-            <a:off x="2222438" y="1690687"/>
+            <a:off x="838200" y="1690688"/>
             <a:ext cx="1263201" cy="885521"/>
           </a:xfrm>
           <a:prstGeom prst="rect">
@@ -6335,10 +6118,10 @@
       </p:pic>
       <p:pic>
         <p:nvPicPr>
-          <p:cNvPr id="2" name="Picture 1">
-            <a:extLst>
-              <a:ext uri="{FF2B5EF4-FFF2-40B4-BE49-F238E27FC236}">
-                <a16:creationId xmlns:a16="http://schemas.microsoft.com/office/drawing/2014/main" id="{8813518D-09EF-4B68-A152-4482C147D3B7}"/>
+          <p:cNvPr id="33" name="Picture 32">
+            <a:extLst>
+              <a:ext uri="{FF2B5EF4-FFF2-40B4-BE49-F238E27FC236}">
+                <a16:creationId xmlns:a16="http://schemas.microsoft.com/office/drawing/2014/main" id="{5EE27BFF-CC36-42F8-80A0-A00748767C28}"/>
               </a:ext>
             </a:extLst>
           </p:cNvPr>
@@ -6357,13 +6140,12 @@
         </p:blipFill>
         <p:spPr>
           <a:xfrm>
-            <a:off x="3606676" y="1690687"/>
+            <a:off x="2222438" y="1690687"/>
             <a:ext cx="1263201" cy="885521"/>
           </a:xfrm>
           <a:prstGeom prst="rect">
             <a:avLst/>
           </a:prstGeom>
-          <a:noFill/>
         </p:spPr>
       </p:pic>
       <p:pic>
@@ -6518,50 +6300,6 @@
           </a:p>
         </p:txBody>
       </p:sp>
-      <p:sp>
-        <p:nvSpPr>
-          <p:cNvPr id="28" name="Right Bracket 27">
-            <a:extLst>
-              <a:ext uri="{FF2B5EF4-FFF2-40B4-BE49-F238E27FC236}">
-                <a16:creationId xmlns:a16="http://schemas.microsoft.com/office/drawing/2014/main" id="{027CAEF2-47FE-4B99-9762-060D48B12D2D}"/>
-              </a:ext>
-            </a:extLst>
-          </p:cNvPr>
-          <p:cNvSpPr/>
-          <p:nvPr/>
-        </p:nvSpPr>
-        <p:spPr>
-          <a:xfrm>
-            <a:off x="1990648" y="4160571"/>
-            <a:ext cx="360000" cy="1260000"/>
-          </a:xfrm>
-          <a:prstGeom prst="rightBracket">
-            <a:avLst/>
-          </a:prstGeom>
-        </p:spPr>
-        <p:style>
-          <a:lnRef idx="1">
-            <a:schemeClr val="accent1"/>
-          </a:lnRef>
-          <a:fillRef idx="0">
-            <a:schemeClr val="accent1"/>
-          </a:fillRef>
-          <a:effectRef idx="0">
-            <a:schemeClr val="accent1"/>
-          </a:effectRef>
-          <a:fontRef idx="minor">
-            <a:schemeClr val="tx1"/>
-          </a:fontRef>
-        </p:style>
-        <p:txBody>
-          <a:bodyPr rtlCol="0" anchor="ctr"/>
-          <a:lstStyle/>
-          <a:p>
-            <a:pPr algn="ctr"/>
-            <a:endParaRPr lang="nb-NO"/>
-          </a:p>
-        </p:txBody>
-      </p:sp>
       <p:cxnSp>
         <p:nvCxnSpPr>
           <p:cNvPr id="30" name="Straight Arrow Connector 29">
@@ -6573,15 +6311,15 @@
           </p:cNvPr>
           <p:cNvCxnSpPr>
             <a:cxnSpLocks/>
-            <a:stCxn id="28" idx="2"/>
+            <a:stCxn id="10" idx="3"/>
             <a:endCxn id="26" idx="1"/>
           </p:cNvCxnSpPr>
           <p:nvPr/>
         </p:nvCxnSpPr>
         <p:spPr>
-          <a:xfrm flipV="1">
-            <a:off x="2350648" y="4789056"/>
-            <a:ext cx="691433" cy="1515"/>
+          <a:xfrm>
+            <a:off x="1900585" y="4789056"/>
+            <a:ext cx="1141496" cy="0"/>
           </a:xfrm>
           <a:prstGeom prst="straightConnector1">
             <a:avLst/>
@@ -6605,36 +6343,6 @@
           </a:fontRef>
         </p:style>
       </p:cxnSp>
-      <p:pic>
-        <p:nvPicPr>
-          <p:cNvPr id="37" name="Picture 36">
-            <a:extLst>
-              <a:ext uri="{FF2B5EF4-FFF2-40B4-BE49-F238E27FC236}">
-                <a16:creationId xmlns:a16="http://schemas.microsoft.com/office/drawing/2014/main" id="{42E629EB-ACF1-44B7-A3F6-F47B8E5B67FD}"/>
-              </a:ext>
-            </a:extLst>
-          </p:cNvPr>
-          <p:cNvPicPr>
-            <a:picLocks noChangeAspect="1"/>
-          </p:cNvPicPr>
-          <p:nvPr/>
-        </p:nvPicPr>
-        <p:blipFill>
-          <a:blip r:embed="rId10"/>
-          <a:stretch>
-            <a:fillRect/>
-          </a:stretch>
-        </p:blipFill>
-        <p:spPr>
-          <a:xfrm>
-            <a:off x="4990914" y="1690687"/>
-            <a:ext cx="1263201" cy="885521"/>
-          </a:xfrm>
-          <a:prstGeom prst="rect">
-            <a:avLst/>
-          </a:prstGeom>
-        </p:spPr>
-      </p:pic>
     </p:spTree>
     <p:extLst>
       <p:ext uri="{BB962C8B-B14F-4D97-AF65-F5344CB8AC3E}">
@@ -6827,18 +6535,13 @@
           <a:p>
             <a:pPr algn="ctr"/>
             <a:r>
-              <a:rPr lang="nb-NO" err="1">
+              <a:rPr lang="nb-NO" dirty="0">
                 <a:solidFill>
                   <a:schemeClr val="tx1"/>
                 </a:solidFill>
               </a:rPr>
               <a:t>Expose</a:t>
             </a:r>
-            <a:endParaRPr lang="nb-NO">
-              <a:solidFill>
-                <a:schemeClr val="tx1"/>
-              </a:solidFill>
-            </a:endParaRPr>
           </a:p>
         </p:txBody>
       </p:sp>
@@ -6886,18 +6589,13 @@
           <a:p>
             <a:pPr algn="ctr"/>
             <a:r>
-              <a:rPr lang="nb-NO" err="1">
+              <a:rPr lang="nb-NO" dirty="0">
                 <a:solidFill>
                   <a:schemeClr val="tx1"/>
                 </a:solidFill>
               </a:rPr>
               <a:t>Consume</a:t>
             </a:r>
-            <a:endParaRPr lang="nb-NO">
-              <a:solidFill>
-                <a:schemeClr val="tx1"/>
-              </a:solidFill>
-            </a:endParaRPr>
           </a:p>
         </p:txBody>
       </p:sp>
@@ -7796,9 +7494,12 @@
 </file>
 
 <file path=customXml/item1.xml><?xml version="1.0" encoding="utf-8"?>
-<p:properties xmlns:p="http://schemas.microsoft.com/office/2006/metadata/properties" xmlns:xsi="http://www.w3.org/2001/XMLSchema-instance" xmlns:pc="http://schemas.microsoft.com/office/infopath/2007/PartnerControls">
-  <documentManagement/>
-</p:properties>
+<?mso-contentType ?>
+<FormTemplates xmlns="http://schemas.microsoft.com/sharepoint/v3/contenttype/forms">
+  <Display>DocumentLibraryForm</Display>
+  <Edit>DocumentLibraryForm</Edit>
+  <New>DocumentLibraryForm</New>
+</FormTemplates>
 </file>
 
 <file path=customXml/item2.xml><?xml version="1.0" encoding="utf-8"?>
@@ -7993,19 +7694,15 @@
 </file>
 
 <file path=customXml/item3.xml><?xml version="1.0" encoding="utf-8"?>
-<?mso-contentType ?>
-<FormTemplates xmlns="http://schemas.microsoft.com/sharepoint/v3/contenttype/forms">
-  <Display>DocumentLibraryForm</Display>
-  <Edit>DocumentLibraryForm</Edit>
-  <New>DocumentLibraryForm</New>
-</FormTemplates>
+<p:properties xmlns:p="http://schemas.microsoft.com/office/2006/metadata/properties" xmlns:xsi="http://www.w3.org/2001/XMLSchema-instance" xmlns:pc="http://schemas.microsoft.com/office/infopath/2007/PartnerControls">
+  <documentManagement/>
+</p:properties>
 </file>
 
 <file path=customXml/itemProps1.xml><?xml version="1.0" encoding="utf-8"?>
-<ds:datastoreItem xmlns:ds="http://schemas.openxmlformats.org/officeDocument/2006/customXml" ds:itemID="{7E1C6FA1-99CE-405E-91D8-17ECF3E677E8}">
+<ds:datastoreItem xmlns:ds="http://schemas.openxmlformats.org/officeDocument/2006/customXml" ds:itemID="{D5BDD655-772C-4B02-B30F-25A24A8E96AC}">
   <ds:schemaRefs>
-    <ds:schemaRef ds:uri="http://schemas.microsoft.com/office/2006/metadata/properties"/>
-    <ds:schemaRef ds:uri="http://schemas.microsoft.com/office/infopath/2007/PartnerControls"/>
+    <ds:schemaRef ds:uri="http://schemas.microsoft.com/sharepoint/v3/contenttype/forms"/>
   </ds:schemaRefs>
 </ds:datastoreItem>
 </file>
@@ -8030,9 +7727,10 @@
 </file>
 
 <file path=customXml/itemProps3.xml><?xml version="1.0" encoding="utf-8"?>
-<ds:datastoreItem xmlns:ds="http://schemas.openxmlformats.org/officeDocument/2006/customXml" ds:itemID="{D5BDD655-772C-4B02-B30F-25A24A8E96AC}">
+<ds:datastoreItem xmlns:ds="http://schemas.openxmlformats.org/officeDocument/2006/customXml" ds:itemID="{7E1C6FA1-99CE-405E-91D8-17ECF3E677E8}">
   <ds:schemaRefs>
-    <ds:schemaRef ds:uri="http://schemas.microsoft.com/sharepoint/v3/contenttype/forms"/>
+    <ds:schemaRef ds:uri="http://schemas.microsoft.com/office/2006/metadata/properties"/>
+    <ds:schemaRef ds:uri="http://schemas.microsoft.com/office/infopath/2007/PartnerControls"/>
   </ds:schemaRefs>
 </ds:datastoreItem>
 </file>
</xml_diff>